<commit_message>
added references and incitation
made some more changes in the poster
</commit_message>
<xml_diff>
--- a/Caroline Iheanacho_CSD_CA1.ppt.pptx
+++ b/Caroline Iheanacho_CSD_CA1.ppt.pptx
@@ -145,7 +145,7 @@
             <a:srgbClr val="A4A3A4"/>
           </p15:clr>
         </p15:guide>
-        <p15:guide id="2" orient="horz" pos="17995">
+        <p15:guide id="2" orient="horz" pos="18359" userDrawn="1">
           <p15:clr>
             <a:srgbClr val="A4A3A4"/>
           </p15:clr>
@@ -982,14 +982,17 @@
       </dgm:t>
     </dgm:pt>
     <dgm:pt modelId="{EF5302F9-EE7E-43D8-B097-D8ABDF0F2753}">
-      <dgm:prSet phldrT="[Text]"/>
+      <dgm:prSet phldrT="[Text]" custT="1"/>
       <dgm:spPr/>
       <dgm:t>
         <a:bodyPr/>
         <a:lstStyle/>
         <a:p>
           <a:r>
-            <a:rPr lang="en-GB" dirty="0"/>
+            <a:rPr lang="en-GB" sz="3600" dirty="0">
+              <a:latin typeface="Arial" panose="020B0604020202020204" pitchFamily="34" charset="0"/>
+              <a:cs typeface="Arial" panose="020B0604020202020204" pitchFamily="34" charset="0"/>
+            </a:rPr>
             <a:t>Mapping  Processes</a:t>
           </a:r>
         </a:p>
@@ -1029,11 +1032,7 @@
               <a:latin typeface="Arial" panose="020B0604020202020204" pitchFamily="34" charset="0"/>
               <a:cs typeface="Arial" panose="020B0604020202020204" pitchFamily="34" charset="0"/>
             </a:rPr>
-            <a:t>User Sign-Up/Login: Auth through OAuth2-JWT issued -Session initialized</a:t>
-          </a:r>
-          <a:r>
-            <a:rPr lang="en-GB" sz="2800" dirty="0"/>
-            <a:t>.</a:t>
+            <a:t>User Sign-Up/Login: Auth through OAuth2-JWT issued -Session initialized.</a:t>
           </a:r>
         </a:p>
       </dgm:t>
@@ -1061,7 +1060,7 @@
       </dgm:t>
     </dgm:pt>
     <dgm:pt modelId="{A9CE465D-5134-40E8-9AB6-DBADF25175FA}">
-      <dgm:prSet phldrT="[Text]" custT="1"/>
+      <dgm:prSet phldrT="[Text]"/>
       <dgm:spPr/>
       <dgm:t>
         <a:bodyPr/>
@@ -1072,11 +1071,18 @@
               <a:latin typeface="Arial" panose="020B0604020202020204" pitchFamily="34" charset="0"/>
               <a:cs typeface="Arial" panose="020B0604020202020204" pitchFamily="34" charset="0"/>
             </a:rPr>
-            <a:t>Event Listing: Frontend request event data through REST- Microservices fetches and returns the data</a:t>
+            <a:t>Event Listing: Frontend request event data through REST- Microservices fetches and returns the </a:t>
           </a:r>
           <a:r>
-            <a:rPr lang="en-GB" sz="2800" dirty="0"/>
-            <a:t>.</a:t>
+            <a:rPr lang="en-GB" dirty="0"/>
+            <a:t>d</a:t>
+          </a:r>
+          <a:r>
+            <a:rPr lang="en-GB" sz="3200" dirty="0">
+              <a:latin typeface="Arial" panose="020B0604020202020204" pitchFamily="34" charset="0"/>
+              <a:cs typeface="Arial" panose="020B0604020202020204" pitchFamily="34" charset="0"/>
+            </a:rPr>
+            <a:t>ata.</a:t>
           </a:r>
         </a:p>
       </dgm:t>
@@ -1118,7 +1124,10 @@
             <a:t>Ticket Purchase: Secure payment microservice invoked - Payment confirmed - Ticket generated</a:t>
           </a:r>
           <a:r>
-            <a:rPr lang="en-GB" sz="2800" dirty="0"/>
+            <a:rPr lang="en-GB" sz="3600" dirty="0">
+              <a:latin typeface="Arial" panose="020B0604020202020204" pitchFamily="34" charset="0"/>
+              <a:cs typeface="Arial" panose="020B0604020202020204" pitchFamily="34" charset="0"/>
+            </a:rPr>
             <a:t>.</a:t>
           </a:r>
         </a:p>
@@ -1154,8 +1163,39 @@
         <a:lstStyle/>
         <a:p>
           <a:r>
-            <a:rPr lang="en-GB" dirty="0"/>
-            <a:t>Admin Interface: Secure backend interface with RBAC for event organisers</a:t>
+            <a:rPr lang="en-GB" dirty="0">
+              <a:latin typeface="Arial" panose="020B0604020202020204" pitchFamily="34" charset="0"/>
+              <a:cs typeface="Arial" panose="020B0604020202020204" pitchFamily="34" charset="0"/>
+            </a:rPr>
+            <a:t>Admin Interface: Secure backend interface with RBAC for event organisers. (</a:t>
+          </a:r>
+          <a:r>
+            <a:rPr lang="en-GB" dirty="0" err="1">
+              <a:latin typeface="Arial" panose="020B0604020202020204" pitchFamily="34" charset="0"/>
+              <a:cs typeface="Arial" panose="020B0604020202020204" pitchFamily="34" charset="0"/>
+            </a:rPr>
+            <a:t>chloe</a:t>
+          </a:r>
+          <a:r>
+            <a:rPr lang="en-GB" dirty="0">
+              <a:latin typeface="Arial" panose="020B0604020202020204" pitchFamily="34" charset="0"/>
+              <a:cs typeface="Arial" panose="020B0604020202020204" pitchFamily="34" charset="0"/>
+            </a:rPr>
+            <a:t> and </a:t>
+          </a:r>
+          <a:r>
+            <a:rPr lang="en-GB" dirty="0" err="1">
+              <a:latin typeface="Arial" panose="020B0604020202020204" pitchFamily="34" charset="0"/>
+              <a:cs typeface="Arial" panose="020B0604020202020204" pitchFamily="34" charset="0"/>
+            </a:rPr>
+            <a:t>chloe</a:t>
+          </a:r>
+          <a:r>
+            <a:rPr lang="en-GB" dirty="0">
+              <a:latin typeface="Arial" panose="020B0604020202020204" pitchFamily="34" charset="0"/>
+              <a:cs typeface="Arial" panose="020B0604020202020204" pitchFamily="34" charset="0"/>
+            </a:rPr>
+            <a:t> 2023)</a:t>
           </a:r>
         </a:p>
       </dgm:t>
@@ -1221,7 +1261,7 @@
       <dgm:spPr/>
     </dgm:pt>
     <dgm:pt modelId="{B71C1D65-106F-4EDB-9CBD-D13C8D81BCA4}" type="pres">
-      <dgm:prSet presAssocID="{20E8BF04-BCD9-4FBE-80BC-7BC6634186F3}" presName="tx2" presStyleLbl="revTx" presStyleIdx="1" presStyleCnt="5"/>
+      <dgm:prSet presAssocID="{20E8BF04-BCD9-4FBE-80BC-7BC6634186F3}" presName="tx2" presStyleLbl="revTx" presStyleIdx="1" presStyleCnt="5" custScaleX="91543"/>
       <dgm:spPr/>
     </dgm:pt>
     <dgm:pt modelId="{5A2C2391-2F2C-4D95-9467-A745E4A67B6C}" type="pres">
@@ -1229,7 +1269,7 @@
       <dgm:spPr/>
     </dgm:pt>
     <dgm:pt modelId="{5591662A-D241-4D9B-801B-92FD32EFEAEE}" type="pres">
-      <dgm:prSet presAssocID="{20E8BF04-BCD9-4FBE-80BC-7BC6634186F3}" presName="thinLine2b" presStyleLbl="callout" presStyleIdx="0" presStyleCnt="4" custLinFactY="-100000" custLinFactNeighborX="-126" custLinFactNeighborY="-197663"/>
+      <dgm:prSet presAssocID="{20E8BF04-BCD9-4FBE-80BC-7BC6634186F3}" presName="thinLine2b" presStyleLbl="callout" presStyleIdx="0" presStyleCnt="4" custLinFactY="-107844" custLinFactNeighborX="8345" custLinFactNeighborY="-200000"/>
       <dgm:spPr/>
     </dgm:pt>
     <dgm:pt modelId="{DD11840C-74AD-4A8E-BE69-017BE6E7F884}" type="pres">
@@ -1245,7 +1285,7 @@
       <dgm:spPr/>
     </dgm:pt>
     <dgm:pt modelId="{015113B7-C37B-411F-BE8B-FE0B1B4B497F}" type="pres">
-      <dgm:prSet presAssocID="{A9CE465D-5134-40E8-9AB6-DBADF25175FA}" presName="tx2" presStyleLbl="revTx" presStyleIdx="2" presStyleCnt="5" custScaleX="104811" custScaleY="122505"/>
+      <dgm:prSet presAssocID="{A9CE465D-5134-40E8-9AB6-DBADF25175FA}" presName="tx2" presStyleLbl="revTx" presStyleIdx="2" presStyleCnt="5"/>
       <dgm:spPr/>
     </dgm:pt>
     <dgm:pt modelId="{99740CDA-4A72-44D5-BB40-C9931C40CF04}" type="pres">
@@ -1301,7 +1341,7 @@
       <dgm:spPr/>
     </dgm:pt>
     <dgm:pt modelId="{CE75CF94-0B5A-4510-BB71-46ED049EAB53}" type="pres">
-      <dgm:prSet presAssocID="{43FDE829-40C1-4629-95C2-488F2F0046DA}" presName="thinLine2b" presStyleLbl="callout" presStyleIdx="3" presStyleCnt="4"/>
+      <dgm:prSet presAssocID="{43FDE829-40C1-4629-95C2-488F2F0046DA}" presName="thinLine2b" presStyleLbl="callout" presStyleIdx="3" presStyleCnt="4" custLinFactY="500000" custLinFactNeighborX="2284" custLinFactNeighborY="531585"/>
       <dgm:spPr/>
     </dgm:pt>
     <dgm:pt modelId="{98CA51AE-F27B-4083-A386-8E6CF5FAFFFD}" type="pres">
@@ -1376,8 +1416,8 @@
       </dsp:nvSpPr>
       <dsp:spPr>
         <a:xfrm>
-          <a:off x="0" y="2621"/>
-          <a:ext cx="10628993" cy="0"/>
+          <a:off x="0" y="0"/>
+          <a:ext cx="13253894" cy="0"/>
         </a:xfrm>
         <a:prstGeom prst="line">
           <a:avLst/>
@@ -1425,8 +1465,8 @@
       </dsp:nvSpPr>
       <dsp:spPr>
         <a:xfrm>
-          <a:off x="0" y="2621"/>
-          <a:ext cx="2046911" cy="5363903"/>
+          <a:off x="0" y="0"/>
+          <a:ext cx="2650778" cy="5545453"/>
         </a:xfrm>
         <a:prstGeom prst="rect">
           <a:avLst/>
@@ -1450,12 +1490,12 @@
         <a:fontRef idx="minor"/>
       </dsp:style>
       <dsp:txBody>
-        <a:bodyPr spcFirstLastPara="0" vert="horz" wrap="square" lIns="133350" tIns="133350" rIns="133350" bIns="133350" numCol="1" spcCol="1270" anchor="t" anchorCtr="0">
+        <a:bodyPr spcFirstLastPara="0" vert="horz" wrap="square" lIns="137160" tIns="137160" rIns="137160" bIns="137160" numCol="1" spcCol="1270" anchor="t" anchorCtr="0">
           <a:noAutofit/>
         </a:bodyPr>
         <a:lstStyle/>
         <a:p>
-          <a:pPr marL="0" lvl="0" indent="0" algn="l" defTabSz="1555750">
+          <a:pPr marL="0" lvl="0" indent="0" algn="l" defTabSz="1600200">
             <a:lnSpc>
               <a:spcPct val="90000"/>
             </a:lnSpc>
@@ -1468,14 +1508,17 @@
             <a:buNone/>
           </a:pPr>
           <a:r>
-            <a:rPr lang="en-GB" sz="3500" kern="1200" dirty="0"/>
+            <a:rPr lang="en-GB" sz="3600" kern="1200" dirty="0">
+              <a:latin typeface="Arial" panose="020B0604020202020204" pitchFamily="34" charset="0"/>
+              <a:cs typeface="Arial" panose="020B0604020202020204" pitchFamily="34" charset="0"/>
+            </a:rPr>
             <a:t>Mapping  Processes</a:t>
           </a:r>
         </a:p>
       </dsp:txBody>
       <dsp:txXfrm>
-        <a:off x="0" y="2621"/>
-        <a:ext cx="2046911" cy="5363903"/>
+        <a:off x="0" y="0"/>
+        <a:ext cx="2650778" cy="5545453"/>
       </dsp:txXfrm>
     </dsp:sp>
     <dsp:sp modelId="{B71C1D65-106F-4EDB-9CBD-D13C8D81BCA4}">
@@ -1485,8 +1528,8 @@
       </dsp:nvSpPr>
       <dsp:spPr>
         <a:xfrm>
-          <a:off x="2200429" y="63319"/>
-          <a:ext cx="8034127" cy="1213949"/>
+          <a:off x="2849587" y="66136"/>
+          <a:ext cx="9524414" cy="1322731"/>
         </a:xfrm>
         <a:prstGeom prst="rect">
           <a:avLst/>
@@ -1532,17 +1575,13 @@
               <a:latin typeface="Arial" panose="020B0604020202020204" pitchFamily="34" charset="0"/>
               <a:cs typeface="Arial" panose="020B0604020202020204" pitchFamily="34" charset="0"/>
             </a:rPr>
-            <a:t>User Sign-Up/Login: Auth through OAuth2-JWT issued -Session initialized</a:t>
-          </a:r>
-          <a:r>
-            <a:rPr lang="en-GB" sz="2800" kern="1200" dirty="0"/>
-            <a:t>.</a:t>
+            <a:t>User Sign-Up/Login: Auth through OAuth2-JWT issued -Session initialized.</a:t>
           </a:r>
         </a:p>
       </dsp:txBody>
       <dsp:txXfrm>
-        <a:off x="2200429" y="63319"/>
-        <a:ext cx="8034127" cy="1213949"/>
+        <a:off x="2849587" y="66136"/>
+        <a:ext cx="9524414" cy="1322731"/>
       </dsp:txXfrm>
     </dsp:sp>
     <dsp:sp modelId="{5591662A-D241-4D9B-801B-92FD32EFEAEE}">
@@ -1552,8 +1591,8 @@
       </dsp:nvSpPr>
       <dsp:spPr>
         <a:xfrm>
-          <a:off x="2036595" y="1121292"/>
-          <a:ext cx="8187646" cy="0"/>
+          <a:off x="2650778" y="1217770"/>
+          <a:ext cx="10603115" cy="0"/>
         </a:xfrm>
         <a:prstGeom prst="line">
           <a:avLst/>
@@ -1600,8 +1639,8 @@
       </dsp:nvSpPr>
       <dsp:spPr>
         <a:xfrm>
-          <a:off x="2200429" y="1337966"/>
-          <a:ext cx="8420649" cy="1487149"/>
+          <a:off x="2849587" y="1455004"/>
+          <a:ext cx="10404306" cy="1322731"/>
         </a:xfrm>
         <a:prstGeom prst="rect">
           <a:avLst/>
@@ -1625,12 +1664,12 @@
         <a:fontRef idx="minor"/>
       </dsp:style>
       <dsp:txBody>
-        <a:bodyPr spcFirstLastPara="0" vert="horz" wrap="square" lIns="121920" tIns="121920" rIns="121920" bIns="121920" numCol="1" spcCol="1270" anchor="t" anchorCtr="0">
+        <a:bodyPr spcFirstLastPara="0" vert="horz" wrap="square" lIns="133350" tIns="133350" rIns="133350" bIns="133350" numCol="1" spcCol="1270" anchor="t" anchorCtr="0">
           <a:noAutofit/>
         </a:bodyPr>
         <a:lstStyle/>
         <a:p>
-          <a:pPr marL="0" lvl="0" indent="0" algn="l" defTabSz="1422400">
+          <a:pPr marL="0" lvl="0" indent="0" algn="l" defTabSz="1555750">
             <a:lnSpc>
               <a:spcPct val="90000"/>
             </a:lnSpc>
@@ -1643,21 +1682,28 @@
             <a:buNone/>
           </a:pPr>
           <a:r>
-            <a:rPr lang="en-GB" sz="3200" kern="1200" dirty="0">
+            <a:rPr lang="en-GB" sz="3500" kern="1200" dirty="0">
               <a:latin typeface="Arial" panose="020B0604020202020204" pitchFamily="34" charset="0"/>
               <a:cs typeface="Arial" panose="020B0604020202020204" pitchFamily="34" charset="0"/>
             </a:rPr>
-            <a:t>Event Listing: Frontend request event data through REST- Microservices fetches and returns the data</a:t>
+            <a:t>Event Listing: Frontend request event data through REST- Microservices fetches and returns the </a:t>
           </a:r>
           <a:r>
-            <a:rPr lang="en-GB" sz="2800" kern="1200" dirty="0"/>
-            <a:t>.</a:t>
+            <a:rPr lang="en-GB" sz="3500" kern="1200" dirty="0"/>
+            <a:t>d</a:t>
+          </a:r>
+          <a:r>
+            <a:rPr lang="en-GB" sz="3500" kern="1200" dirty="0">
+              <a:latin typeface="Arial" panose="020B0604020202020204" pitchFamily="34" charset="0"/>
+              <a:cs typeface="Arial" panose="020B0604020202020204" pitchFamily="34" charset="0"/>
+            </a:rPr>
+            <a:t>ata.</a:t>
           </a:r>
         </a:p>
       </dsp:txBody>
       <dsp:txXfrm>
-        <a:off x="2200429" y="1337966"/>
-        <a:ext cx="8420649" cy="1487149"/>
+        <a:off x="2849587" y="1455004"/>
+        <a:ext cx="10404306" cy="1322731"/>
       </dsp:txXfrm>
     </dsp:sp>
     <dsp:sp modelId="{BD831C94-6FF6-475F-95AD-8D83A2624C17}">
@@ -1667,8 +1713,8 @@
       </dsp:nvSpPr>
       <dsp:spPr>
         <a:xfrm>
-          <a:off x="1689438" y="2696932"/>
-          <a:ext cx="8187646" cy="0"/>
+          <a:off x="2187846" y="2641291"/>
+          <a:ext cx="10603115" cy="0"/>
         </a:xfrm>
         <a:prstGeom prst="line">
           <a:avLst/>
@@ -1715,8 +1761,8 @@
       </dsp:nvSpPr>
       <dsp:spPr>
         <a:xfrm>
-          <a:off x="1941409" y="2729723"/>
-          <a:ext cx="8034127" cy="1213949"/>
+          <a:off x="2514152" y="2673795"/>
+          <a:ext cx="10404306" cy="1322731"/>
         </a:xfrm>
         <a:prstGeom prst="rect">
           <a:avLst/>
@@ -1765,14 +1811,17 @@
             <a:t>Ticket Purchase: Secure payment microservice invoked - Payment confirmed - Ticket generated</a:t>
           </a:r>
           <a:r>
-            <a:rPr lang="en-GB" sz="2800" kern="1200" dirty="0"/>
+            <a:rPr lang="en-GB" sz="3600" kern="1200" dirty="0">
+              <a:latin typeface="Arial" panose="020B0604020202020204" pitchFamily="34" charset="0"/>
+              <a:cs typeface="Arial" panose="020B0604020202020204" pitchFamily="34" charset="0"/>
+            </a:rPr>
             <a:t>.</a:t>
           </a:r>
         </a:p>
       </dsp:txBody>
       <dsp:txXfrm>
-        <a:off x="1941409" y="2729723"/>
-        <a:ext cx="8034127" cy="1213949"/>
+        <a:off x="2514152" y="2673795"/>
+        <a:ext cx="10404306" cy="1322731"/>
       </dsp:txXfrm>
     </dsp:sp>
     <dsp:sp modelId="{CCB4DC0D-E47C-4F8A-8848-7B1665BE481C}">
@@ -1782,8 +1831,8 @@
       </dsp:nvSpPr>
       <dsp:spPr>
         <a:xfrm>
-          <a:off x="1999095" y="4094382"/>
-          <a:ext cx="8187646" cy="0"/>
+          <a:off x="2588856" y="4160741"/>
+          <a:ext cx="10603115" cy="0"/>
         </a:xfrm>
         <a:prstGeom prst="line">
           <a:avLst/>
@@ -1830,8 +1879,8 @@
       </dsp:nvSpPr>
       <dsp:spPr>
         <a:xfrm>
-          <a:off x="2200429" y="4160460"/>
-          <a:ext cx="7987770" cy="1144026"/>
+          <a:off x="2849587" y="4232740"/>
+          <a:ext cx="10344273" cy="1246542"/>
         </a:xfrm>
         <a:prstGeom prst="rect">
           <a:avLst/>
@@ -1855,12 +1904,12 @@
         <a:fontRef idx="minor"/>
       </dsp:style>
       <dsp:txBody>
-        <a:bodyPr spcFirstLastPara="0" vert="horz" wrap="square" lIns="125730" tIns="125730" rIns="125730" bIns="125730" numCol="1" spcCol="1270" anchor="t" anchorCtr="0">
+        <a:bodyPr spcFirstLastPara="0" vert="horz" wrap="square" lIns="133350" tIns="133350" rIns="133350" bIns="133350" numCol="1" spcCol="1270" anchor="t" anchorCtr="0">
           <a:noAutofit/>
         </a:bodyPr>
         <a:lstStyle/>
         <a:p>
-          <a:pPr marL="0" lvl="0" indent="0" algn="l" defTabSz="1466850">
+          <a:pPr marL="0" lvl="0" indent="0" algn="l" defTabSz="1555750">
             <a:lnSpc>
               <a:spcPct val="90000"/>
             </a:lnSpc>
@@ -1873,14 +1922,45 @@
             <a:buNone/>
           </a:pPr>
           <a:r>
-            <a:rPr lang="en-GB" sz="3300" kern="1200" dirty="0"/>
-            <a:t>Admin Interface: Secure backend interface with RBAC for event organisers</a:t>
+            <a:rPr lang="en-GB" sz="3500" kern="1200" dirty="0">
+              <a:latin typeface="Arial" panose="020B0604020202020204" pitchFamily="34" charset="0"/>
+              <a:cs typeface="Arial" panose="020B0604020202020204" pitchFamily="34" charset="0"/>
+            </a:rPr>
+            <a:t>Admin Interface: Secure backend interface with RBAC for event organisers. (</a:t>
+          </a:r>
+          <a:r>
+            <a:rPr lang="en-GB" sz="3500" kern="1200" dirty="0" err="1">
+              <a:latin typeface="Arial" panose="020B0604020202020204" pitchFamily="34" charset="0"/>
+              <a:cs typeface="Arial" panose="020B0604020202020204" pitchFamily="34" charset="0"/>
+            </a:rPr>
+            <a:t>chloe</a:t>
+          </a:r>
+          <a:r>
+            <a:rPr lang="en-GB" sz="3500" kern="1200" dirty="0">
+              <a:latin typeface="Arial" panose="020B0604020202020204" pitchFamily="34" charset="0"/>
+              <a:cs typeface="Arial" panose="020B0604020202020204" pitchFamily="34" charset="0"/>
+            </a:rPr>
+            <a:t> and </a:t>
+          </a:r>
+          <a:r>
+            <a:rPr lang="en-GB" sz="3500" kern="1200" dirty="0" err="1">
+              <a:latin typeface="Arial" panose="020B0604020202020204" pitchFamily="34" charset="0"/>
+              <a:cs typeface="Arial" panose="020B0604020202020204" pitchFamily="34" charset="0"/>
+            </a:rPr>
+            <a:t>chloe</a:t>
+          </a:r>
+          <a:r>
+            <a:rPr lang="en-GB" sz="3500" kern="1200" dirty="0">
+              <a:latin typeface="Arial" panose="020B0604020202020204" pitchFamily="34" charset="0"/>
+              <a:cs typeface="Arial" panose="020B0604020202020204" pitchFamily="34" charset="0"/>
+            </a:rPr>
+            <a:t> 2023)</a:t>
           </a:r>
         </a:p>
       </dsp:txBody>
       <dsp:txXfrm>
-        <a:off x="2200429" y="4160460"/>
-        <a:ext cx="7987770" cy="1144026"/>
+        <a:off x="2849587" y="4232740"/>
+        <a:ext cx="10344273" cy="1246542"/>
       </dsp:txXfrm>
     </dsp:sp>
     <dsp:sp modelId="{CE75CF94-0B5A-4510-BB71-46ED049EAB53}">
@@ -1890,8 +1970,8 @@
       </dsp:nvSpPr>
       <dsp:spPr>
         <a:xfrm>
-          <a:off x="2046911" y="5304487"/>
-          <a:ext cx="8187646" cy="0"/>
+          <a:off x="2650778" y="5545453"/>
+          <a:ext cx="10603115" cy="0"/>
         </a:xfrm>
         <a:prstGeom prst="line">
           <a:avLst/>
@@ -3989,7 +4069,7 @@
                 <a:spcPct val="0"/>
               </a:spcBef>
             </a:pPr>
-            <a:endParaRPr lang="en-US" altLang="en-US"/>
+            <a:endParaRPr lang="en-US" altLang="en-US" dirty="0"/>
           </a:p>
         </p:txBody>
       </p:sp>
@@ -8921,7 +9001,7 @@
         </p:nvSpPr>
         <p:spPr bwMode="auto">
           <a:xfrm>
-            <a:off x="15022844" y="22448682"/>
+            <a:off x="15153829" y="22862526"/>
             <a:ext cx="12337653" cy="489365"/>
           </a:xfrm>
           <a:prstGeom prst="rect">
@@ -9072,7 +9152,31 @@
               <a:rPr lang="en-GB" altLang="en-US" sz="2400" b="1" dirty="0">
                 <a:cs typeface="Arial" panose="020B0604020202020204" pitchFamily="34" charset="0"/>
               </a:rPr>
-              <a:t>Fig. 1 shows how MVC works and Architecture</a:t>
+              <a:t>Fig. 1 shows how MVC works and Architecture (</a:t>
+            </a:r>
+            <a:r>
+              <a:rPr lang="en-GB" altLang="en-US" sz="2400" b="1" dirty="0" err="1">
+                <a:cs typeface="Arial" panose="020B0604020202020204" pitchFamily="34" charset="0"/>
+              </a:rPr>
+              <a:t>Yeran</a:t>
+            </a:r>
+            <a:r>
+              <a:rPr lang="en-GB" altLang="en-US" sz="2400" b="1" dirty="0">
+                <a:cs typeface="Arial" panose="020B0604020202020204" pitchFamily="34" charset="0"/>
+              </a:rPr>
+              <a:t> </a:t>
+            </a:r>
+            <a:r>
+              <a:rPr lang="en-GB" altLang="en-US" sz="2400" b="1" dirty="0" err="1">
+                <a:cs typeface="Arial" panose="020B0604020202020204" pitchFamily="34" charset="0"/>
+              </a:rPr>
+              <a:t>Kods</a:t>
+            </a:r>
+            <a:r>
+              <a:rPr lang="en-GB" altLang="en-US" sz="2400" b="1" dirty="0">
+                <a:cs typeface="Arial" panose="020B0604020202020204" pitchFamily="34" charset="0"/>
+              </a:rPr>
+              <a:t>, 2023)</a:t>
             </a:r>
             <a:endParaRPr lang="en-GB" altLang="en-US" sz="2400" dirty="0">
               <a:cs typeface="Arial" panose="020B0604020202020204" pitchFamily="34" charset="0"/>
@@ -9258,7 +9362,7 @@
         </p:nvSpPr>
         <p:spPr bwMode="auto">
           <a:xfrm>
-            <a:off x="15022844" y="14269365"/>
+            <a:off x="15310856" y="14792918"/>
             <a:ext cx="12660312" cy="8045450"/>
           </a:xfrm>
           <a:prstGeom prst="rect">
@@ -9820,8 +9924,8 @@
         </p:nvSpPr>
         <p:spPr bwMode="auto">
           <a:xfrm>
-            <a:off x="29186396" y="20419516"/>
-            <a:ext cx="12417216" cy="783741"/>
+            <a:off x="29490418" y="21645435"/>
+            <a:ext cx="12225907" cy="409023"/>
           </a:xfrm>
           <a:prstGeom prst="rect">
             <a:avLst/>
@@ -9972,26 +10076,19 @@
             </a:pPr>
             <a:r>
               <a:rPr lang="en-GB" altLang="en-US" sz="3600" b="1" dirty="0">
+                <a:solidFill>
+                  <a:srgbClr val="006684"/>
+                </a:solidFill>
                 <a:cs typeface="Arial" panose="020B0604020202020204" pitchFamily="34" charset="0"/>
               </a:rPr>
               <a:t>References</a:t>
             </a:r>
             <a:endParaRPr lang="en-GB" altLang="en-US" sz="3600" dirty="0">
+              <a:solidFill>
+                <a:srgbClr val="006684"/>
+              </a:solidFill>
               <a:cs typeface="Arial" panose="020B0604020202020204" pitchFamily="34" charset="0"/>
             </a:endParaRPr>
-          </a:p>
-          <a:p>
-            <a:pPr eaLnBrk="1" hangingPunct="1">
-              <a:lnSpc>
-                <a:spcPts val="2200"/>
-              </a:lnSpc>
-            </a:pPr>
-            <a:r>
-              <a:rPr lang="en-GB" altLang="en-US" sz="1500" dirty="0">
-                <a:cs typeface="Arial" panose="020B0604020202020204" pitchFamily="34" charset="0"/>
-              </a:rPr>
-              <a:t>Reference text size 15pt Arial and exactly 22pt space between lines</a:t>
-            </a:r>
           </a:p>
         </p:txBody>
       </p:sp>
@@ -10241,7 +10338,7 @@
         </p:nvSpPr>
         <p:spPr bwMode="auto">
           <a:xfrm>
-            <a:off x="96837" y="194896"/>
+            <a:off x="0" y="0"/>
             <a:ext cx="42919650" cy="3668420"/>
           </a:xfrm>
           <a:prstGeom prst="rect">
@@ -10584,531 +10681,6 @@
       </p:sp>
       <p:sp>
         <p:nvSpPr>
-          <p:cNvPr id="3093" name="Rectangle 31">
-            <a:extLst>
-              <a:ext uri="{FF2B5EF4-FFF2-40B4-BE49-F238E27FC236}">
-                <a16:creationId xmlns:a16="http://schemas.microsoft.com/office/drawing/2014/main" id="{39DC954E-06FF-5265-340F-AEBEF53FD344}"/>
-              </a:ext>
-            </a:extLst>
-          </p:cNvPr>
-          <p:cNvSpPr>
-            <a:spLocks noChangeArrowheads="1"/>
-          </p:cNvSpPr>
-          <p:nvPr/>
-        </p:nvSpPr>
-        <p:spPr bwMode="auto">
-          <a:xfrm>
-            <a:off x="0" y="0"/>
-            <a:ext cx="42808525" cy="0"/>
-          </a:xfrm>
-          <a:prstGeom prst="rect">
-            <a:avLst/>
-          </a:prstGeom>
-          <a:noFill/>
-          <a:ln>
-            <a:noFill/>
-          </a:ln>
-          <a:effectLst/>
-          <a:extLst>
-            <a:ext uri="{909E8E84-426E-40DD-AFC4-6F175D3DCCD1}">
-              <a14:hiddenFill xmlns:a14="http://schemas.microsoft.com/office/drawing/2010/main">
-                <a:solidFill>
-                  <a:schemeClr val="accent1"/>
-                </a:solidFill>
-              </a14:hiddenFill>
-            </a:ext>
-            <a:ext uri="{91240B29-F687-4F45-9708-019B960494DF}">
-              <a14:hiddenLine xmlns:a14="http://schemas.microsoft.com/office/drawing/2010/main" w="9525">
-                <a:solidFill>
-                  <a:schemeClr val="tx1"/>
-                </a:solidFill>
-                <a:miter lim="800000"/>
-                <a:headEnd/>
-                <a:tailEnd/>
-              </a14:hiddenLine>
-            </a:ext>
-            <a:ext uri="{AF507438-7753-43E0-B8FC-AC1667EBCBE1}">
-              <a14:hiddenEffects xmlns:a14="http://schemas.microsoft.com/office/drawing/2010/main">
-                <a:effectLst>
-                  <a:outerShdw dist="35921" dir="2700000" algn="ctr" rotWithShape="0">
-                    <a:schemeClr val="bg2"/>
-                  </a:outerShdw>
-                </a:effectLst>
-              </a14:hiddenEffects>
-            </a:ext>
-          </a:extLst>
-        </p:spPr>
-        <p:txBody>
-          <a:bodyPr wrap="none" anchor="ctr">
-            <a:spAutoFit/>
-          </a:bodyPr>
-          <a:lstStyle>
-            <a:lvl1pPr>
-              <a:defRPr sz="2300">
-                <a:solidFill>
-                  <a:schemeClr val="tx1"/>
-                </a:solidFill>
-                <a:latin typeface="Arial" panose="020B0604020202020204" pitchFamily="34" charset="0"/>
-                <a:ea typeface="MS PGothic" panose="020B0600070205080204" pitchFamily="34" charset="-128"/>
-              </a:defRPr>
-            </a:lvl1pPr>
-            <a:lvl2pPr marL="742950" indent="-285750">
-              <a:defRPr sz="2300">
-                <a:solidFill>
-                  <a:schemeClr val="tx1"/>
-                </a:solidFill>
-                <a:latin typeface="Arial" panose="020B0604020202020204" pitchFamily="34" charset="0"/>
-                <a:ea typeface="MS PGothic" panose="020B0600070205080204" pitchFamily="34" charset="-128"/>
-              </a:defRPr>
-            </a:lvl2pPr>
-            <a:lvl3pPr marL="1143000" indent="-228600">
-              <a:defRPr sz="2300">
-                <a:solidFill>
-                  <a:schemeClr val="tx1"/>
-                </a:solidFill>
-                <a:latin typeface="Arial" panose="020B0604020202020204" pitchFamily="34" charset="0"/>
-                <a:ea typeface="MS PGothic" panose="020B0600070205080204" pitchFamily="34" charset="-128"/>
-              </a:defRPr>
-            </a:lvl3pPr>
-            <a:lvl4pPr marL="1600200" indent="-228600">
-              <a:defRPr sz="2300">
-                <a:solidFill>
-                  <a:schemeClr val="tx1"/>
-                </a:solidFill>
-                <a:latin typeface="Arial" panose="020B0604020202020204" pitchFamily="34" charset="0"/>
-                <a:ea typeface="MS PGothic" panose="020B0600070205080204" pitchFamily="34" charset="-128"/>
-              </a:defRPr>
-            </a:lvl4pPr>
-            <a:lvl5pPr marL="2057400" indent="-228600">
-              <a:defRPr sz="2300">
-                <a:solidFill>
-                  <a:schemeClr val="tx1"/>
-                </a:solidFill>
-                <a:latin typeface="Arial" panose="020B0604020202020204" pitchFamily="34" charset="0"/>
-                <a:ea typeface="MS PGothic" panose="020B0600070205080204" pitchFamily="34" charset="-128"/>
-              </a:defRPr>
-            </a:lvl5pPr>
-            <a:lvl6pPr marL="2514600" indent="-228600" eaLnBrk="0" fontAlgn="base" hangingPunct="0">
-              <a:spcBef>
-                <a:spcPct val="0"/>
-              </a:spcBef>
-              <a:spcAft>
-                <a:spcPct val="0"/>
-              </a:spcAft>
-              <a:defRPr sz="2300">
-                <a:solidFill>
-                  <a:schemeClr val="tx1"/>
-                </a:solidFill>
-                <a:latin typeface="Arial" panose="020B0604020202020204" pitchFamily="34" charset="0"/>
-                <a:ea typeface="MS PGothic" panose="020B0600070205080204" pitchFamily="34" charset="-128"/>
-              </a:defRPr>
-            </a:lvl6pPr>
-            <a:lvl7pPr marL="2971800" indent="-228600" eaLnBrk="0" fontAlgn="base" hangingPunct="0">
-              <a:spcBef>
-                <a:spcPct val="0"/>
-              </a:spcBef>
-              <a:spcAft>
-                <a:spcPct val="0"/>
-              </a:spcAft>
-              <a:defRPr sz="2300">
-                <a:solidFill>
-                  <a:schemeClr val="tx1"/>
-                </a:solidFill>
-                <a:latin typeface="Arial" panose="020B0604020202020204" pitchFamily="34" charset="0"/>
-                <a:ea typeface="MS PGothic" panose="020B0600070205080204" pitchFamily="34" charset="-128"/>
-              </a:defRPr>
-            </a:lvl7pPr>
-            <a:lvl8pPr marL="3429000" indent="-228600" eaLnBrk="0" fontAlgn="base" hangingPunct="0">
-              <a:spcBef>
-                <a:spcPct val="0"/>
-              </a:spcBef>
-              <a:spcAft>
-                <a:spcPct val="0"/>
-              </a:spcAft>
-              <a:defRPr sz="2300">
-                <a:solidFill>
-                  <a:schemeClr val="tx1"/>
-                </a:solidFill>
-                <a:latin typeface="Arial" panose="020B0604020202020204" pitchFamily="34" charset="0"/>
-                <a:ea typeface="MS PGothic" panose="020B0600070205080204" pitchFamily="34" charset="-128"/>
-              </a:defRPr>
-            </a:lvl8pPr>
-            <a:lvl9pPr marL="3886200" indent="-228600" eaLnBrk="0" fontAlgn="base" hangingPunct="0">
-              <a:spcBef>
-                <a:spcPct val="0"/>
-              </a:spcBef>
-              <a:spcAft>
-                <a:spcPct val="0"/>
-              </a:spcAft>
-              <a:defRPr sz="2300">
-                <a:solidFill>
-                  <a:schemeClr val="tx1"/>
-                </a:solidFill>
-                <a:latin typeface="Arial" panose="020B0604020202020204" pitchFamily="34" charset="0"/>
-                <a:ea typeface="MS PGothic" panose="020B0600070205080204" pitchFamily="34" charset="-128"/>
-              </a:defRPr>
-            </a:lvl9pPr>
-          </a:lstStyle>
-          <a:p>
-            <a:r>
-              <a:rPr lang="en-GB" altLang="en-US"/>
-              <a:t>In today's digital age, businesses like "Festivals R Us", a ticket sales system, must provide a seamless and safe user experience across many platforms. With a variety of device types accessible, such as desktops, laptops, smartphones, tablets, and smartwatches, it is critical that users can connect with the application effortlessly and securely. These devices act as major touchpoints for users to view events, order tickets, and make payments. To protect sensitive information, strong security methods such as encryption, authentication, and secure payment processing are essential for ensuring consumer safety and trust across all devices.</a:t>
-            </a:r>
-          </a:p>
-        </p:txBody>
-      </p:sp>
-      <p:sp>
-        <p:nvSpPr>
-          <p:cNvPr id="3094" name="Rectangle 33">
-            <a:extLst>
-              <a:ext uri="{FF2B5EF4-FFF2-40B4-BE49-F238E27FC236}">
-                <a16:creationId xmlns:a16="http://schemas.microsoft.com/office/drawing/2014/main" id="{26FD5413-C3DC-0C47-2B29-482C455BF085}"/>
-              </a:ext>
-            </a:extLst>
-          </p:cNvPr>
-          <p:cNvSpPr>
-            <a:spLocks noChangeArrowheads="1"/>
-          </p:cNvSpPr>
-          <p:nvPr/>
-        </p:nvSpPr>
-        <p:spPr bwMode="auto">
-          <a:xfrm>
-            <a:off x="41275" y="146050"/>
-            <a:ext cx="42808525" cy="0"/>
-          </a:xfrm>
-          <a:prstGeom prst="rect">
-            <a:avLst/>
-          </a:prstGeom>
-          <a:noFill/>
-          <a:ln>
-            <a:noFill/>
-          </a:ln>
-          <a:effectLst/>
-          <a:extLst>
-            <a:ext uri="{909E8E84-426E-40DD-AFC4-6F175D3DCCD1}">
-              <a14:hiddenFill xmlns:a14="http://schemas.microsoft.com/office/drawing/2010/main">
-                <a:solidFill>
-                  <a:schemeClr val="accent1"/>
-                </a:solidFill>
-              </a14:hiddenFill>
-            </a:ext>
-            <a:ext uri="{91240B29-F687-4F45-9708-019B960494DF}">
-              <a14:hiddenLine xmlns:a14="http://schemas.microsoft.com/office/drawing/2010/main" w="9525">
-                <a:solidFill>
-                  <a:schemeClr val="tx1"/>
-                </a:solidFill>
-                <a:miter lim="800000"/>
-                <a:headEnd/>
-                <a:tailEnd/>
-              </a14:hiddenLine>
-            </a:ext>
-            <a:ext uri="{AF507438-7753-43E0-B8FC-AC1667EBCBE1}">
-              <a14:hiddenEffects xmlns:a14="http://schemas.microsoft.com/office/drawing/2010/main">
-                <a:effectLst>
-                  <a:outerShdw dist="35921" dir="2700000" algn="ctr" rotWithShape="0">
-                    <a:schemeClr val="bg2"/>
-                  </a:outerShdw>
-                </a:effectLst>
-              </a14:hiddenEffects>
-            </a:ext>
-          </a:extLst>
-        </p:spPr>
-        <p:txBody>
-          <a:bodyPr wrap="none" anchor="ctr">
-            <a:spAutoFit/>
-          </a:bodyPr>
-          <a:lstStyle>
-            <a:lvl1pPr>
-              <a:defRPr sz="2300">
-                <a:solidFill>
-                  <a:schemeClr val="tx1"/>
-                </a:solidFill>
-                <a:latin typeface="Arial" panose="020B0604020202020204" pitchFamily="34" charset="0"/>
-                <a:ea typeface="MS PGothic" panose="020B0600070205080204" pitchFamily="34" charset="-128"/>
-              </a:defRPr>
-            </a:lvl1pPr>
-            <a:lvl2pPr marL="742950" indent="-285750">
-              <a:defRPr sz="2300">
-                <a:solidFill>
-                  <a:schemeClr val="tx1"/>
-                </a:solidFill>
-                <a:latin typeface="Arial" panose="020B0604020202020204" pitchFamily="34" charset="0"/>
-                <a:ea typeface="MS PGothic" panose="020B0600070205080204" pitchFamily="34" charset="-128"/>
-              </a:defRPr>
-            </a:lvl2pPr>
-            <a:lvl3pPr marL="1143000" indent="-228600">
-              <a:defRPr sz="2300">
-                <a:solidFill>
-                  <a:schemeClr val="tx1"/>
-                </a:solidFill>
-                <a:latin typeface="Arial" panose="020B0604020202020204" pitchFamily="34" charset="0"/>
-                <a:ea typeface="MS PGothic" panose="020B0600070205080204" pitchFamily="34" charset="-128"/>
-              </a:defRPr>
-            </a:lvl3pPr>
-            <a:lvl4pPr marL="1600200" indent="-228600">
-              <a:defRPr sz="2300">
-                <a:solidFill>
-                  <a:schemeClr val="tx1"/>
-                </a:solidFill>
-                <a:latin typeface="Arial" panose="020B0604020202020204" pitchFamily="34" charset="0"/>
-                <a:ea typeface="MS PGothic" panose="020B0600070205080204" pitchFamily="34" charset="-128"/>
-              </a:defRPr>
-            </a:lvl4pPr>
-            <a:lvl5pPr marL="2057400" indent="-228600">
-              <a:defRPr sz="2300">
-                <a:solidFill>
-                  <a:schemeClr val="tx1"/>
-                </a:solidFill>
-                <a:latin typeface="Arial" panose="020B0604020202020204" pitchFamily="34" charset="0"/>
-                <a:ea typeface="MS PGothic" panose="020B0600070205080204" pitchFamily="34" charset="-128"/>
-              </a:defRPr>
-            </a:lvl5pPr>
-            <a:lvl6pPr marL="2514600" indent="-228600" eaLnBrk="0" fontAlgn="base" hangingPunct="0">
-              <a:spcBef>
-                <a:spcPct val="0"/>
-              </a:spcBef>
-              <a:spcAft>
-                <a:spcPct val="0"/>
-              </a:spcAft>
-              <a:defRPr sz="2300">
-                <a:solidFill>
-                  <a:schemeClr val="tx1"/>
-                </a:solidFill>
-                <a:latin typeface="Arial" panose="020B0604020202020204" pitchFamily="34" charset="0"/>
-                <a:ea typeface="MS PGothic" panose="020B0600070205080204" pitchFamily="34" charset="-128"/>
-              </a:defRPr>
-            </a:lvl6pPr>
-            <a:lvl7pPr marL="2971800" indent="-228600" eaLnBrk="0" fontAlgn="base" hangingPunct="0">
-              <a:spcBef>
-                <a:spcPct val="0"/>
-              </a:spcBef>
-              <a:spcAft>
-                <a:spcPct val="0"/>
-              </a:spcAft>
-              <a:defRPr sz="2300">
-                <a:solidFill>
-                  <a:schemeClr val="tx1"/>
-                </a:solidFill>
-                <a:latin typeface="Arial" panose="020B0604020202020204" pitchFamily="34" charset="0"/>
-                <a:ea typeface="MS PGothic" panose="020B0600070205080204" pitchFamily="34" charset="-128"/>
-              </a:defRPr>
-            </a:lvl7pPr>
-            <a:lvl8pPr marL="3429000" indent="-228600" eaLnBrk="0" fontAlgn="base" hangingPunct="0">
-              <a:spcBef>
-                <a:spcPct val="0"/>
-              </a:spcBef>
-              <a:spcAft>
-                <a:spcPct val="0"/>
-              </a:spcAft>
-              <a:defRPr sz="2300">
-                <a:solidFill>
-                  <a:schemeClr val="tx1"/>
-                </a:solidFill>
-                <a:latin typeface="Arial" panose="020B0604020202020204" pitchFamily="34" charset="0"/>
-                <a:ea typeface="MS PGothic" panose="020B0600070205080204" pitchFamily="34" charset="-128"/>
-              </a:defRPr>
-            </a:lvl8pPr>
-            <a:lvl9pPr marL="3886200" indent="-228600" eaLnBrk="0" fontAlgn="base" hangingPunct="0">
-              <a:spcBef>
-                <a:spcPct val="0"/>
-              </a:spcBef>
-              <a:spcAft>
-                <a:spcPct val="0"/>
-              </a:spcAft>
-              <a:defRPr sz="2300">
-                <a:solidFill>
-                  <a:schemeClr val="tx1"/>
-                </a:solidFill>
-                <a:latin typeface="Arial" panose="020B0604020202020204" pitchFamily="34" charset="0"/>
-                <a:ea typeface="MS PGothic" panose="020B0600070205080204" pitchFamily="34" charset="-128"/>
-              </a:defRPr>
-            </a:lvl9pPr>
-          </a:lstStyle>
-          <a:p>
-            <a:r>
-              <a:rPr lang="en-GB" altLang="en-US"/>
-              <a:t>Spring is a popular Java open-source framework for building scalable, secure, and high-performance enterprise applications. It supports multiple modules, including Spring Boot for microservices, Spring Security for authentication and authorisation, and Spring Data for database management.</a:t>
-            </a:r>
-          </a:p>
-        </p:txBody>
-      </p:sp>
-      <p:sp>
-        <p:nvSpPr>
-          <p:cNvPr id="3095" name="Rectangle 34">
-            <a:extLst>
-              <a:ext uri="{FF2B5EF4-FFF2-40B4-BE49-F238E27FC236}">
-                <a16:creationId xmlns:a16="http://schemas.microsoft.com/office/drawing/2014/main" id="{65E6CDAD-3E9E-9989-ADBB-F922B978A903}"/>
-              </a:ext>
-            </a:extLst>
-          </p:cNvPr>
-          <p:cNvSpPr>
-            <a:spLocks noChangeArrowheads="1"/>
-          </p:cNvSpPr>
-          <p:nvPr/>
-        </p:nvSpPr>
-        <p:spPr bwMode="auto">
-          <a:xfrm>
-            <a:off x="152400" y="152400"/>
-            <a:ext cx="42808525" cy="0"/>
-          </a:xfrm>
-          <a:prstGeom prst="rect">
-            <a:avLst/>
-          </a:prstGeom>
-          <a:noFill/>
-          <a:ln>
-            <a:noFill/>
-          </a:ln>
-          <a:effectLst/>
-          <a:extLst>
-            <a:ext uri="{909E8E84-426E-40DD-AFC4-6F175D3DCCD1}">
-              <a14:hiddenFill xmlns:a14="http://schemas.microsoft.com/office/drawing/2010/main">
-                <a:solidFill>
-                  <a:schemeClr val="accent1"/>
-                </a:solidFill>
-              </a14:hiddenFill>
-            </a:ext>
-            <a:ext uri="{91240B29-F687-4F45-9708-019B960494DF}">
-              <a14:hiddenLine xmlns:a14="http://schemas.microsoft.com/office/drawing/2010/main" w="9525">
-                <a:solidFill>
-                  <a:schemeClr val="tx1"/>
-                </a:solidFill>
-                <a:miter lim="800000"/>
-                <a:headEnd/>
-                <a:tailEnd/>
-              </a14:hiddenLine>
-            </a:ext>
-            <a:ext uri="{AF507438-7753-43E0-B8FC-AC1667EBCBE1}">
-              <a14:hiddenEffects xmlns:a14="http://schemas.microsoft.com/office/drawing/2010/main">
-                <a:effectLst>
-                  <a:outerShdw dist="35921" dir="2700000" algn="ctr" rotWithShape="0">
-                    <a:schemeClr val="bg2"/>
-                  </a:outerShdw>
-                </a:effectLst>
-              </a14:hiddenEffects>
-            </a:ext>
-          </a:extLst>
-        </p:spPr>
-        <p:txBody>
-          <a:bodyPr wrap="none" anchor="ctr">
-            <a:spAutoFit/>
-          </a:bodyPr>
-          <a:lstStyle>
-            <a:lvl1pPr>
-              <a:defRPr sz="2300">
-                <a:solidFill>
-                  <a:schemeClr val="tx1"/>
-                </a:solidFill>
-                <a:latin typeface="Arial" panose="020B0604020202020204" pitchFamily="34" charset="0"/>
-                <a:ea typeface="MS PGothic" panose="020B0600070205080204" pitchFamily="34" charset="-128"/>
-              </a:defRPr>
-            </a:lvl1pPr>
-            <a:lvl2pPr marL="742950" indent="-285750">
-              <a:defRPr sz="2300">
-                <a:solidFill>
-                  <a:schemeClr val="tx1"/>
-                </a:solidFill>
-                <a:latin typeface="Arial" panose="020B0604020202020204" pitchFamily="34" charset="0"/>
-                <a:ea typeface="MS PGothic" panose="020B0600070205080204" pitchFamily="34" charset="-128"/>
-              </a:defRPr>
-            </a:lvl2pPr>
-            <a:lvl3pPr marL="1143000" indent="-228600">
-              <a:defRPr sz="2300">
-                <a:solidFill>
-                  <a:schemeClr val="tx1"/>
-                </a:solidFill>
-                <a:latin typeface="Arial" panose="020B0604020202020204" pitchFamily="34" charset="0"/>
-                <a:ea typeface="MS PGothic" panose="020B0600070205080204" pitchFamily="34" charset="-128"/>
-              </a:defRPr>
-            </a:lvl3pPr>
-            <a:lvl4pPr marL="1600200" indent="-228600">
-              <a:defRPr sz="2300">
-                <a:solidFill>
-                  <a:schemeClr val="tx1"/>
-                </a:solidFill>
-                <a:latin typeface="Arial" panose="020B0604020202020204" pitchFamily="34" charset="0"/>
-                <a:ea typeface="MS PGothic" panose="020B0600070205080204" pitchFamily="34" charset="-128"/>
-              </a:defRPr>
-            </a:lvl4pPr>
-            <a:lvl5pPr marL="2057400" indent="-228600">
-              <a:defRPr sz="2300">
-                <a:solidFill>
-                  <a:schemeClr val="tx1"/>
-                </a:solidFill>
-                <a:latin typeface="Arial" panose="020B0604020202020204" pitchFamily="34" charset="0"/>
-                <a:ea typeface="MS PGothic" panose="020B0600070205080204" pitchFamily="34" charset="-128"/>
-              </a:defRPr>
-            </a:lvl5pPr>
-            <a:lvl6pPr marL="2514600" indent="-228600" eaLnBrk="0" fontAlgn="base" hangingPunct="0">
-              <a:spcBef>
-                <a:spcPct val="0"/>
-              </a:spcBef>
-              <a:spcAft>
-                <a:spcPct val="0"/>
-              </a:spcAft>
-              <a:defRPr sz="2300">
-                <a:solidFill>
-                  <a:schemeClr val="tx1"/>
-                </a:solidFill>
-                <a:latin typeface="Arial" panose="020B0604020202020204" pitchFamily="34" charset="0"/>
-                <a:ea typeface="MS PGothic" panose="020B0600070205080204" pitchFamily="34" charset="-128"/>
-              </a:defRPr>
-            </a:lvl6pPr>
-            <a:lvl7pPr marL="2971800" indent="-228600" eaLnBrk="0" fontAlgn="base" hangingPunct="0">
-              <a:spcBef>
-                <a:spcPct val="0"/>
-              </a:spcBef>
-              <a:spcAft>
-                <a:spcPct val="0"/>
-              </a:spcAft>
-              <a:defRPr sz="2300">
-                <a:solidFill>
-                  <a:schemeClr val="tx1"/>
-                </a:solidFill>
-                <a:latin typeface="Arial" panose="020B0604020202020204" pitchFamily="34" charset="0"/>
-                <a:ea typeface="MS PGothic" panose="020B0600070205080204" pitchFamily="34" charset="-128"/>
-              </a:defRPr>
-            </a:lvl7pPr>
-            <a:lvl8pPr marL="3429000" indent="-228600" eaLnBrk="0" fontAlgn="base" hangingPunct="0">
-              <a:spcBef>
-                <a:spcPct val="0"/>
-              </a:spcBef>
-              <a:spcAft>
-                <a:spcPct val="0"/>
-              </a:spcAft>
-              <a:defRPr sz="2300">
-                <a:solidFill>
-                  <a:schemeClr val="tx1"/>
-                </a:solidFill>
-                <a:latin typeface="Arial" panose="020B0604020202020204" pitchFamily="34" charset="0"/>
-                <a:ea typeface="MS PGothic" panose="020B0600070205080204" pitchFamily="34" charset="-128"/>
-              </a:defRPr>
-            </a:lvl8pPr>
-            <a:lvl9pPr marL="3886200" indent="-228600" eaLnBrk="0" fontAlgn="base" hangingPunct="0">
-              <a:spcBef>
-                <a:spcPct val="0"/>
-              </a:spcBef>
-              <a:spcAft>
-                <a:spcPct val="0"/>
-              </a:spcAft>
-              <a:defRPr sz="2300">
-                <a:solidFill>
-                  <a:schemeClr val="tx1"/>
-                </a:solidFill>
-                <a:latin typeface="Arial" panose="020B0604020202020204" pitchFamily="34" charset="0"/>
-                <a:ea typeface="MS PGothic" panose="020B0600070205080204" pitchFamily="34" charset="-128"/>
-              </a:defRPr>
-            </a:lvl9pPr>
-          </a:lstStyle>
-          <a:p>
-            <a:r>
-              <a:rPr lang="en-GB" altLang="en-US"/>
-              <a:t>Spring is a popular Java open-source framework for building scalable, secure, and high-performance enterprise applications. It supports multiple modules, including Spring Boot for microservices, Spring Security for authentication and authorisation, and Spring Data for database management.</a:t>
-            </a:r>
-          </a:p>
-        </p:txBody>
-      </p:sp>
-      <p:sp>
-        <p:nvSpPr>
           <p:cNvPr id="2" name="TextBox 1">
             <a:extLst>
               <a:ext uri="{FF2B5EF4-FFF2-40B4-BE49-F238E27FC236}">
@@ -11176,15 +10748,7 @@
           <a:p>
             <a:r>
               <a:rPr lang="en-GB" sz="3600" dirty="0"/>
-              <a:t>For “Festival R Us,” Spring framework Architecture is recommended according to (“Introduction to Spring Framework: Java Enterprise </a:t>
-            </a:r>
-            <a:r>
-              <a:rPr lang="en-GB" sz="3600"/>
-              <a:t>Development” 2019 </a:t>
-            </a:r>
-            <a:r>
-              <a:rPr lang="en-GB" sz="3600" dirty="0"/>
-              <a:t>) as it uses a modular approach, and  it allows the components to be integrated and configured.</a:t>
+              <a:t>For “Festival R Us,” Spring framework Architecture is recommended according to (“Introduction to Spring Framework: Java Enterprise Development” 2019 ) as it uses a modular approach, and  it allows the components to be integrated and configured.</a:t>
             </a:r>
           </a:p>
         </p:txBody>
@@ -11203,8 +10767,8 @@
         </p:nvSpPr>
         <p:spPr>
           <a:xfrm>
-            <a:off x="444109" y="13867778"/>
-            <a:ext cx="13706780" cy="11633954"/>
+            <a:off x="444109" y="13453660"/>
+            <a:ext cx="13706780" cy="11834009"/>
           </a:xfrm>
           <a:prstGeom prst="rect">
             <a:avLst/>
@@ -11315,7 +10879,7 @@
             </a:pPr>
             <a:r>
               <a:rPr lang="en-GB" sz="3600" dirty="0"/>
-              <a:t>Not suitable for enterprise-grade applications.</a:t>
+              <a:t>Not suitable for enterprise-grade applications. (linkedin.com 2024)</a:t>
             </a:r>
           </a:p>
           <a:p>
@@ -11361,14 +10925,8 @@
             </a:pPr>
             <a:r>
               <a:rPr lang="en-GB" sz="3600" dirty="0"/>
-              <a:t>Has strong performance and support from Microsoft.</a:t>
-            </a:r>
-          </a:p>
-          <a:p>
-            <a:pPr marL="342900" indent="-342900">
-              <a:buFont typeface="Arial" panose="020B0604020202020204" pitchFamily="34" charset="0"/>
-              <a:buChar char="•"/>
-            </a:pPr>
+              <a:t>Has strong performance and support from Microsoft. </a:t>
+            </a:r>
             <a:endParaRPr lang="en-GB" dirty="0"/>
           </a:p>
           <a:p>
@@ -11450,7 +11008,7 @@
         <p:spPr>
           <a:xfrm>
             <a:off x="14690827" y="5860472"/>
-            <a:ext cx="14255648" cy="8424000"/>
+            <a:ext cx="14125472" cy="10064294"/>
           </a:xfrm>
           <a:prstGeom prst="rect">
             <a:avLst/>
@@ -11475,7 +11033,7 @@
             </a:pPr>
             <a:r>
               <a:rPr lang="en-GB" sz="3600" dirty="0"/>
-              <a:t>It uses microservices architecture that allows services like payments, events listing, and ticket inventory to run independently.</a:t>
+              <a:t>It uses microservices architecture that allows services like payments, events listing, and ticket inventory to run independently. (Atlassian, 2025)</a:t>
             </a:r>
           </a:p>
           <a:p>
@@ -11511,7 +11069,15 @@
             </a:pPr>
             <a:r>
               <a:rPr lang="en-GB" sz="3600" dirty="0"/>
-              <a:t>It enables secure payment handling and user authentication and is critical for GDPR compliance.</a:t>
+              <a:t>It enables secure payment handling and user authentication and is critical for GDPR compliance. (</a:t>
+            </a:r>
+            <a:r>
+              <a:rPr lang="en-GB" sz="3600" dirty="0" err="1"/>
+              <a:t>GeeksforGeeks</a:t>
+            </a:r>
+            <a:r>
+              <a:rPr lang="en-GB" sz="3600" dirty="0"/>
+              <a:t>, 2024)</a:t>
             </a:r>
           </a:p>
           <a:p>
@@ -11658,7 +11224,7 @@
         <p:spPr>
           <a:xfrm flipH="1">
             <a:off x="29186396" y="5963591"/>
-            <a:ext cx="12306300" cy="7478970"/>
+            <a:ext cx="12306300" cy="7971413"/>
           </a:xfrm>
           <a:prstGeom prst="rect">
             <a:avLst/>
@@ -11693,13 +11259,25 @@
             </a:pPr>
             <a:r>
               <a:rPr lang="en-GB" sz="3200" dirty="0"/>
-              <a:t>Must provide opt-in/opt-out mechanisms and support data erasure requests.</a:t>
+              <a:t>Must provide opt-in/opt-out mechanisms and support data erasure requests. (gov.ie 2020)</a:t>
             </a:r>
           </a:p>
           <a:p>
             <a:r>
               <a:rPr lang="en-GB" sz="3200" b="1" dirty="0"/>
-              <a:t>Ethical Payment Processing.</a:t>
+              <a:t>Ethical Payment Processing. </a:t>
+            </a:r>
+            <a:r>
+              <a:rPr lang="en-GB" sz="3200" dirty="0"/>
+              <a:t>(</a:t>
+            </a:r>
+            <a:r>
+              <a:rPr lang="en-GB" sz="3200" dirty="0" err="1"/>
+              <a:t>Fruhlinger</a:t>
+            </a:r>
+            <a:r>
+              <a:rPr lang="en-GB" sz="3200" dirty="0"/>
+              <a:t>, 2024) </a:t>
             </a:r>
           </a:p>
           <a:p>
@@ -11775,7 +11353,7 @@
             </a:pPr>
             <a:r>
               <a:rPr lang="en-GB" sz="3200" dirty="0"/>
-              <a:t> A secure development lifecycle must be followed.</a:t>
+              <a:t> A secure development lifecycle must be followed (“About Secure by Design” 2023)</a:t>
             </a:r>
           </a:p>
         </p:txBody>
@@ -12024,7 +11602,7 @@
         </p:nvSpPr>
         <p:spPr>
           <a:xfrm>
-            <a:off x="29386088" y="13558193"/>
+            <a:off x="29429867" y="14346746"/>
             <a:ext cx="11961812" cy="1107996"/>
           </a:xfrm>
           <a:prstGeom prst="rect">
@@ -12063,7 +11641,7 @@
         </p:nvSpPr>
         <p:spPr>
           <a:xfrm>
-            <a:off x="29431869" y="14890990"/>
+            <a:off x="29450731" y="15912195"/>
             <a:ext cx="11677086" cy="5078313"/>
           </a:xfrm>
           <a:prstGeom prst="rect">
@@ -12114,7 +11692,7 @@
         <p:spPr bwMode="auto">
           <a:xfrm>
             <a:off x="444109" y="431851"/>
-            <a:ext cx="10568448" cy="3298732"/>
+            <a:ext cx="10038834" cy="3133423"/>
           </a:xfrm>
           <a:prstGeom prst="rect">
             <a:avLst/>
@@ -12182,8 +11760,8 @@
         </p:blipFill>
         <p:spPr>
           <a:xfrm>
-            <a:off x="14590502" y="14418339"/>
-            <a:ext cx="13283723" cy="7896476"/>
+            <a:off x="15374443" y="14869205"/>
+            <a:ext cx="12596725" cy="7984760"/>
           </a:xfrm>
           <a:prstGeom prst="rect">
             <a:avLst/>
@@ -12203,14 +11781,14 @@
           <p:nvPr>
             <p:extLst>
               <p:ext uri="{D42A27DB-BD31-4B8C-83A1-F6EECF244321}">
-                <p14:modId xmlns:p14="http://schemas.microsoft.com/office/powerpoint/2010/main" val="149075558"/>
+                <p14:modId xmlns:p14="http://schemas.microsoft.com/office/powerpoint/2010/main" val="3262673783"/>
               </p:ext>
             </p:extLst>
           </p:nvPr>
         </p:nvGraphicFramePr>
         <p:xfrm>
-          <a:off x="15368587" y="23171584"/>
-          <a:ext cx="10628993" cy="5369147"/>
+          <a:off x="14717275" y="23599459"/>
+          <a:ext cx="13253894" cy="5545453"/>
         </p:xfrm>
         <a:graphic>
           <a:graphicData uri="http://schemas.openxmlformats.org/drawingml/2006/diagram">
@@ -12218,6 +11796,160 @@
           </a:graphicData>
         </a:graphic>
       </p:graphicFrame>
+      <p:sp>
+        <p:nvSpPr>
+          <p:cNvPr id="3106" name="TextBox 3105">
+            <a:extLst>
+              <a:ext uri="{FF2B5EF4-FFF2-40B4-BE49-F238E27FC236}">
+                <a16:creationId xmlns:a16="http://schemas.microsoft.com/office/drawing/2014/main" id="{3FA7A920-9BB8-EC76-72E6-B268AA85B6E9}"/>
+              </a:ext>
+            </a:extLst>
+          </p:cNvPr>
+          <p:cNvSpPr txBox="1"/>
+          <p:nvPr/>
+        </p:nvSpPr>
+        <p:spPr>
+          <a:xfrm>
+            <a:off x="28963936" y="21908787"/>
+            <a:ext cx="12337653" cy="6494085"/>
+          </a:xfrm>
+          <a:prstGeom prst="rect">
+            <a:avLst/>
+          </a:prstGeom>
+          <a:noFill/>
+        </p:spPr>
+        <p:txBody>
+          <a:bodyPr wrap="square" rtlCol="0">
+            <a:spAutoFit/>
+          </a:bodyPr>
+          <a:lstStyle/>
+          <a:p>
+            <a:pPr lvl="1"/>
+            <a:endParaRPr lang="en-GB" sz="1600" dirty="0"/>
+          </a:p>
+          <a:p>
+            <a:pPr lvl="1"/>
+            <a:r>
+              <a:rPr lang="en-GB" sz="1600" dirty="0"/>
+              <a:t>“.NET Cloud Applications with Azure | Build and Consume Cloud Services.” Microsoft, 2025, dotnet.microsoft.com/</a:t>
+            </a:r>
+            <a:r>
+              <a:rPr lang="en-GB" sz="1600" dirty="0" err="1"/>
+              <a:t>en</a:t>
+            </a:r>
+            <a:r>
+              <a:rPr lang="en-GB" sz="1600" dirty="0"/>
+              <a:t>-us/apps/cloud/azure.[Accessed 5 Apr. 2025]</a:t>
+            </a:r>
+          </a:p>
+          <a:p>
+            <a:pPr lvl="1"/>
+            <a:r>
+              <a:rPr lang="en-GB" sz="1600" dirty="0"/>
+              <a:t>.“About Secure by Design.” UK Government Security - Beta, 8 Nov. 2024, www.security.gov.uk/policy-and-guidance/secure-by-design/about/[Accessed 31.March 2025] </a:t>
+            </a:r>
+          </a:p>
+          <a:p>
+            <a:pPr lvl="1"/>
+            <a:r>
+              <a:rPr lang="en-GB" sz="1600" dirty="0"/>
+              <a:t>Atlassian “Microservices Architecture.” Atlassian, 2025, www.atlassian.com/microservices/microservices-architecture.[Accessed 05 Apr. 2025]</a:t>
+            </a:r>
+          </a:p>
+          <a:p>
+            <a:pPr lvl="1"/>
+            <a:r>
+              <a:rPr lang="en-GB" sz="1600" dirty="0" err="1"/>
+              <a:t>chloe</a:t>
+            </a:r>
+            <a:r>
+              <a:rPr lang="en-GB" sz="1600" dirty="0"/>
+              <a:t>, and </a:t>
+            </a:r>
+            <a:r>
+              <a:rPr lang="en-GB" sz="1600" dirty="0" err="1"/>
+              <a:t>chloe</a:t>
+            </a:r>
+            <a:r>
+              <a:rPr lang="en-GB" sz="1600" dirty="0"/>
+              <a:t>. “Implementing Role-Based Access Control (RBAC) in Your Backend.” Moments Log, 18 Sept. 2023, www.momentslog.com/development/web-backend/implementing-role-based-access-control-rbac-in-your-backend. [Accessed 6 Apr. 2025.]</a:t>
+            </a:r>
+          </a:p>
+          <a:p>
+            <a:pPr lvl="1"/>
+            <a:r>
+              <a:rPr lang="en-GB" sz="1600" dirty="0"/>
+              <a:t>Cross-Platform App Development Frameworks, Strategies, and Best Practices | Iterators. 29 Mar. 2024, www.iteratorshq.com/blog/cross-platform-app-development-frameworks-strategies-and-best-practices/.{Accessed 05 Apr. 2025]</a:t>
+            </a:r>
+          </a:p>
+          <a:p>
+            <a:pPr lvl="1"/>
+            <a:r>
+              <a:rPr lang="en-GB" sz="1600" dirty="0" err="1"/>
+              <a:t>Fruhlinger</a:t>
+            </a:r>
+            <a:r>
+              <a:rPr lang="en-GB" sz="1600" dirty="0"/>
+              <a:t>, Josh. “PCI DSS Explained: Requirements, Fines, and Steps to Compliance.” CSO Online, 3 Apr. 2024, www.csoonline.com/article/569591/pci-dss-explained-requirements-fines-and-steps-to-compliance.html.[Accessed 04 Apr. 2025]</a:t>
+            </a:r>
+          </a:p>
+          <a:p>
+            <a:pPr lvl="1"/>
+            <a:r>
+              <a:rPr lang="en-GB" sz="1600" dirty="0" err="1"/>
+              <a:t>GeeksforGeeks</a:t>
+            </a:r>
+            <a:r>
+              <a:rPr lang="en-GB" sz="1600" dirty="0"/>
+              <a:t>. “Spring Security Tutorial.” </a:t>
+            </a:r>
+            <a:r>
+              <a:rPr lang="en-GB" sz="1600" dirty="0" err="1"/>
+              <a:t>GeeksforGeeks</a:t>
+            </a:r>
+            <a:r>
+              <a:rPr lang="en-GB" sz="1600" dirty="0"/>
+              <a:t>, 16 May 2024, www.geeksforgeeks.org/spring-security-tutorial/#prerequisites-for-spring-security.[Accessed 05 Apr. 2025] </a:t>
+            </a:r>
+          </a:p>
+          <a:p>
+            <a:pPr lvl="1"/>
+            <a:r>
+              <a:rPr lang="en-GB" sz="1600" dirty="0"/>
+              <a:t>gov.ie. “Data Protection and the General Data Protection Regulation (GDPR).” Www.gov.ie, 21 Jan. 2020, www.gov.ie/</a:t>
+            </a:r>
+            <a:r>
+              <a:rPr lang="en-GB" sz="1600" dirty="0" err="1"/>
+              <a:t>en</a:t>
+            </a:r>
+            <a:r>
+              <a:rPr lang="en-GB" sz="1600" dirty="0"/>
+              <a:t>/organisation-information/26c38c-data-protection-and-the-general-data-protection-regulation-gdpr/.“[Accessed 04 Apr. 2025.]</a:t>
+            </a:r>
+          </a:p>
+          <a:p>
+            <a:pPr lvl="1"/>
+            <a:r>
+              <a:rPr lang="en-GB" sz="1600" dirty="0"/>
+              <a:t>Introduction to Spring Framework: Java Enterprise Development.” Clouddevs.com, 10 June 2019, clouddevs.com/java/spring-framework/.[Accessed  6 Apr. 2025.]</a:t>
+            </a:r>
+          </a:p>
+          <a:p>
+            <a:pPr lvl="1"/>
+            <a:r>
+              <a:rPr lang="en-GB" sz="1600" dirty="0"/>
+              <a:t>Learn about the Benefits and Features of Six Frameworks That Are Widely Used in Enterprise Software Development, such as Java EE, .NET, Spring, Django, Laravel, and Ruby on Rails.” Linkedin.com, 4 Mar. 2024, www.linkedin.com/advice/1/youre-interested-enterprise-software-what-most-5tdnf. [Accessed 30 Mar. 2025.“]  </a:t>
+            </a:r>
+          </a:p>
+          <a:p>
+            <a:pPr lvl="1"/>
+            <a:r>
+              <a:rPr lang="en-GB" sz="1600" dirty="0"/>
+              <a:t>What Is Spring Framework, and Why Should It Be Used for Web Application Development?” RABILOO CO., LTD, 2025, rabiloo.com/blog/what-is-spring-framework-and-why-should-it-be-used-for-web-application-development.[Accessed 6 Apr. 2025.]</a:t>
+            </a:r>
+          </a:p>
+        </p:txBody>
+      </p:sp>
     </p:spTree>
   </p:cSld>
   <p:clrMapOvr>

</xml_diff>